<commit_message>
Updated with class example
</commit_message>
<xml_diff>
--- a/lectures materials/mmp/MMP3 Paradigms in Python part2.pptx
+++ b/lectures materials/mmp/MMP3 Paradigms in Python part2.pptx
@@ -4271,7 +4271,7 @@
           <p:cNvPr id="2" name="Заголовок 1">
             <a:extLst>
               <a:ext uri="{FF2B5EF4-FFF2-40B4-BE49-F238E27FC236}">
-                <a16:creationId xmlns="" xmlns:a16="http://schemas.microsoft.com/office/drawing/2014/main" id="{9937B8B6-83FA-8F52-6844-2083DF3BFCD4}"/>
+                <a16:creationId xmlns:a16="http://schemas.microsoft.com/office/drawing/2014/main" xmlns="" id="{9937B8B6-83FA-8F52-6844-2083DF3BFCD4}"/>
               </a:ext>
             </a:extLst>
           </p:cNvPr>
@@ -4315,7 +4315,7 @@
           <p:cNvPr id="3" name="Підзаголовок 2">
             <a:extLst>
               <a:ext uri="{FF2B5EF4-FFF2-40B4-BE49-F238E27FC236}">
-                <a16:creationId xmlns="" xmlns:a16="http://schemas.microsoft.com/office/drawing/2014/main" id="{E64F1456-974C-5B4F-F78A-FEBAF0780A05}"/>
+                <a16:creationId xmlns:a16="http://schemas.microsoft.com/office/drawing/2014/main" xmlns="" id="{E64F1456-974C-5B4F-F78A-FEBAF0780A05}"/>
               </a:ext>
             </a:extLst>
           </p:cNvPr>
@@ -4362,6 +4362,39 @@
           </a:p>
         </p:txBody>
       </p:sp>
+      <p:sp>
+        <p:nvSpPr>
+          <p:cNvPr id="4" name="Прямоугольник 3"/>
+          <p:cNvSpPr/>
+          <p:nvPr/>
+        </p:nvSpPr>
+        <p:spPr>
+          <a:xfrm>
+            <a:off x="5255866" y="3275112"/>
+            <a:ext cx="1680268" cy="307777"/>
+          </a:xfrm>
+          <a:prstGeom prst="rect">
+            <a:avLst/>
+          </a:prstGeom>
+        </p:spPr>
+        <p:txBody>
+          <a:bodyPr wrap="none">
+            <a:spAutoFit/>
+          </a:bodyPr>
+          <a:lstStyle/>
+          <a:p>
+            <a:r>
+              <a:rPr lang="en-US" dirty="0"/>
+              <a:t>@</a:t>
+            </a:r>
+            <a:r>
+              <a:rPr lang="en-US"/>
+              <a:t>python_iasa_bot</a:t>
+            </a:r>
+            <a:endParaRPr lang="ru-RU"/>
+          </a:p>
+        </p:txBody>
+      </p:sp>
     </p:spTree>
     <p:extLst>
       <p:ext uri="{BB962C8B-B14F-4D97-AF65-F5344CB8AC3E}">
@@ -4372,6 +4405,13 @@
   <p:clrMapOvr>
     <a:masterClrMapping/>
   </p:clrMapOvr>
+  <p:timing>
+    <p:tnLst>
+      <p:par>
+        <p:cTn id="1" dur="indefinite" restart="never" nodeType="tmRoot"/>
+      </p:par>
+    </p:tnLst>
+  </p:timing>
 </p:sld>
 </file>
 
@@ -4674,6 +4714,13 @@
   <p:clrMapOvr>
     <a:masterClrMapping/>
   </p:clrMapOvr>
+  <p:timing>
+    <p:tnLst>
+      <p:par>
+        <p:cTn id="1" dur="indefinite" restart="never" nodeType="tmRoot"/>
+      </p:par>
+    </p:tnLst>
+  </p:timing>
 </p:sld>
 </file>
 
@@ -4933,6 +4980,13 @@
   <p:clrMapOvr>
     <a:masterClrMapping/>
   </p:clrMapOvr>
+  <p:timing>
+    <p:tnLst>
+      <p:par>
+        <p:cTn id="1" dur="indefinite" restart="never" nodeType="tmRoot"/>
+      </p:par>
+    </p:tnLst>
+  </p:timing>
 </p:sld>
 </file>
 
@@ -5173,6 +5227,13 @@
   <p:clrMapOvr>
     <a:masterClrMapping/>
   </p:clrMapOvr>
+  <p:timing>
+    <p:tnLst>
+      <p:par>
+        <p:cTn id="1" dur="indefinite" restart="never" nodeType="tmRoot"/>
+      </p:par>
+    </p:tnLst>
+  </p:timing>
 </p:sld>
 </file>
 
@@ -5226,6 +5287,13 @@
   <p:clrMapOvr>
     <a:masterClrMapping/>
   </p:clrMapOvr>
+  <p:timing>
+    <p:tnLst>
+      <p:par>
+        <p:cTn id="1" dur="indefinite" restart="never" nodeType="tmRoot"/>
+      </p:par>
+    </p:tnLst>
+  </p:timing>
 </p:sld>
 </file>
 
@@ -5686,6 +5754,13 @@
   <p:clrMapOvr>
     <a:masterClrMapping/>
   </p:clrMapOvr>
+  <p:timing>
+    <p:tnLst>
+      <p:par>
+        <p:cTn id="1" dur="indefinite" restart="never" nodeType="tmRoot"/>
+      </p:par>
+    </p:tnLst>
+  </p:timing>
 </p:sld>
 </file>
 
@@ -6769,6 +6844,13 @@
   <p:clrMapOvr>
     <a:masterClrMapping/>
   </p:clrMapOvr>
+  <p:timing>
+    <p:tnLst>
+      <p:par>
+        <p:cTn id="1" dur="indefinite" restart="never" nodeType="tmRoot"/>
+      </p:par>
+    </p:tnLst>
+  </p:timing>
 </p:sld>
 </file>
 
@@ -7151,6 +7233,13 @@
   <p:clrMapOvr>
     <a:masterClrMapping/>
   </p:clrMapOvr>
+  <p:timing>
+    <p:tnLst>
+      <p:par>
+        <p:cTn id="1" dur="indefinite" restart="never" nodeType="tmRoot"/>
+      </p:par>
+    </p:tnLst>
+  </p:timing>
 </p:sld>
 </file>
 
@@ -7328,6 +7417,13 @@
   <p:clrMapOvr>
     <a:masterClrMapping/>
   </p:clrMapOvr>
+  <p:timing>
+    <p:tnLst>
+      <p:par>
+        <p:cTn id="1" dur="indefinite" restart="never" nodeType="tmRoot"/>
+      </p:par>
+    </p:tnLst>
+  </p:timing>
 </p:sld>
 </file>
 
@@ -7638,6 +7734,13 @@
   <p:clrMapOvr>
     <a:masterClrMapping/>
   </p:clrMapOvr>
+  <p:timing>
+    <p:tnLst>
+      <p:par>
+        <p:cTn id="1" dur="indefinite" restart="never" nodeType="tmRoot"/>
+      </p:par>
+    </p:tnLst>
+  </p:timing>
 </p:sld>
 </file>
 
@@ -7839,6 +7942,13 @@
   <p:clrMapOvr>
     <a:masterClrMapping/>
   </p:clrMapOvr>
+  <p:timing>
+    <p:tnLst>
+      <p:par>
+        <p:cTn id="1" dur="indefinite" restart="never" nodeType="tmRoot"/>
+      </p:par>
+    </p:tnLst>
+  </p:timing>
 </p:sld>
 </file>
 
@@ -8173,6 +8283,13 @@
   <p:clrMapOvr>
     <a:masterClrMapping/>
   </p:clrMapOvr>
+  <p:timing>
+    <p:tnLst>
+      <p:par>
+        <p:cTn id="1" dur="indefinite" restart="never" nodeType="tmRoot"/>
+      </p:par>
+    </p:tnLst>
+  </p:timing>
 </p:sld>
 </file>
 
@@ -8390,6 +8507,13 @@
   <p:clrMapOvr>
     <a:masterClrMapping/>
   </p:clrMapOvr>
+  <p:timing>
+    <p:tnLst>
+      <p:par>
+        <p:cTn id="1" dur="indefinite" restart="never" nodeType="tmRoot"/>
+      </p:par>
+    </p:tnLst>
+  </p:timing>
 </p:sld>
 </file>
 
@@ -8673,7 +8797,7 @@
   <a:extraClrSchemeLst/>
   <a:extLst>
     <a:ext uri="{05A4C25C-085E-4340-85A3-A5531E510DB2}">
-      <thm15:themeFamily xmlns="" xmlns:thm15="http://schemas.microsoft.com/office/thememl/2012/main" name="Тема1" id="{884C1F1E-9F01-4BBC-9178-D2152F7854D1}" vid="{BC98F467-AD48-49C5-B04A-5003BE156FC1}"/>
+      <thm15:themeFamily xmlns:thm15="http://schemas.microsoft.com/office/thememl/2012/main" xmlns="" name="Тема1" id="{884C1F1E-9F01-4BBC-9178-D2152F7854D1}" vid="{BC98F467-AD48-49C5-B04A-5003BE156FC1}"/>
     </a:ext>
   </a:extLst>
 </a:theme>

</xml_diff>